<commit_message>
Jasper and JSON Data Source
</commit_message>
<xml_diff>
--- a/15_Ch12_API_i.pptx
+++ b/15_Ch12_API_i.pptx
@@ -4030,7 +4030,7 @@
                   <a:srgbClr val="FFFF00"/>
                 </a:solidFill>
               </a:rPr>
-              <a:t>11.1 API: i18n</a:t>
+              <a:t>12.1 API: i18n</a:t>
             </a:r>
             <a:endParaRPr lang="zh-TW" altLang="en-US" sz="4800" b="1" dirty="0">
               <a:solidFill>
@@ -4201,7 +4201,7 @@
                   <a:srgbClr val="FFFF00"/>
                 </a:solidFill>
               </a:rPr>
-              <a:t>10.1 API: </a:t>
+              <a:t>12.1 API: </a:t>
             </a:r>
             <a:r>
               <a:rPr lang="en-US" altLang="zh-TW" b="1" dirty="0" err="1">
@@ -4516,7 +4516,7 @@
                   <a:srgbClr val="FFFF00"/>
                 </a:solidFill>
               </a:rPr>
-              <a:t>11.2 API: </a:t>
+              <a:t>12.2 API: </a:t>
             </a:r>
             <a:r>
               <a:rPr lang="en-US" altLang="zh-TW" sz="4800" b="1" dirty="0" err="1">
@@ -4695,7 +4695,7 @@
                   <a:srgbClr val="FFFF00"/>
                 </a:solidFill>
               </a:rPr>
-              <a:t>10.2 API: </a:t>
+              <a:t>12.2 API: </a:t>
             </a:r>
             <a:r>
               <a:rPr lang="en-US" altLang="zh-TW" b="1" dirty="0" err="1">
@@ -5025,7 +5025,7 @@
                   <a:srgbClr val="FFFF00"/>
                 </a:solidFill>
               </a:rPr>
-              <a:t>11.3 API: images</a:t>
+              <a:t>12.3 API: images</a:t>
             </a:r>
             <a:endParaRPr lang="zh-TW" altLang="en-US" sz="4800" b="1" dirty="0">
               <a:solidFill>
@@ -5196,7 +5196,7 @@
                   <a:srgbClr val="FFFF00"/>
                 </a:solidFill>
               </a:rPr>
-              <a:t>10.3 API: images</a:t>
+              <a:t>12.3 API: images</a:t>
             </a:r>
             <a:endParaRPr lang="zh-TW" altLang="en-US" b="1" dirty="0">
               <a:solidFill>

</xml_diff>